<commit_message>
updates to performance slides
</commit_message>
<xml_diff>
--- a/docs/slides/03-performance.pptx
+++ b/docs/slides/03-performance.pptx
@@ -15053,8 +15053,38 @@
           <a:p>
             <a:r>
               <a:rPr lang="en-US" dirty="0"/>
-              <a:t>Input Features</a:t>
-            </a:r>
+              <a:t>Input Features and Models</a:t>
+            </a:r>
+          </a:p>
+        </p:txBody>
+      </p:sp>
+      <p:sp>
+        <p:nvSpPr>
+          <p:cNvPr id="5" name="Content Placeholder 4">
+            <a:extLst>
+              <a:ext uri="{FF2B5EF4-FFF2-40B4-BE49-F238E27FC236}">
+                <a16:creationId xmlns:a16="http://schemas.microsoft.com/office/drawing/2014/main" id="{0BBA4C7A-3FF5-5FA7-9F1C-06C39414F83A}"/>
+              </a:ext>
+            </a:extLst>
+          </p:cNvPr>
+          <p:cNvSpPr>
+            <a:spLocks noGrp="1"/>
+          </p:cNvSpPr>
+          <p:nvPr>
+            <p:ph idx="1"/>
+          </p:nvPr>
+        </p:nvSpPr>
+        <p:spPr>
+          <a:xfrm>
+            <a:off x="838200" y="3841749"/>
+            <a:ext cx="10515600" cy="2335213"/>
+          </a:xfrm>
+        </p:spPr>
+        <p:txBody>
+          <a:bodyPr/>
+          <a:lstStyle/>
+          <a:p>
+            <a:endParaRPr lang="en-US" dirty="0"/>
           </a:p>
         </p:txBody>
       </p:sp>
@@ -15080,7 +15110,7 @@
         </p:blipFill>
         <p:spPr>
           <a:xfrm>
-            <a:off x="289247" y="2766219"/>
+            <a:off x="289247" y="2103438"/>
             <a:ext cx="11613506" cy="1325562"/>
           </a:xfrm>
           <a:prstGeom prst="rect">
@@ -15170,7 +15200,7 @@
           <a:lstStyle/>
           <a:p>
             <a:r>
-              <a:rPr lang="en-US"/>
+              <a:rPr lang="en-US" dirty="0"/>
               <a:t>Inference Errors: Frame Rate</a:t>
             </a:r>
           </a:p>

</xml_diff>